<commit_message>
refactors to be more failsafe and tested with 3 levels of descendants
</commit_message>
<xml_diff>
--- a/QueenVictoriaRoyal92.pptx
+++ b/QueenVictoriaRoyal92.pptx
@@ -6659,8 +6659,8 @@
         </p:nvSpPr>
         <p:spPr>
           <a:xfrm>
-            <a:off x="3048000" y="254000"/>
-            <a:ext cx="1651000" cy="254000"/>
+            <a:off x="2984500" y="254000"/>
+            <a:ext cx="1460500" cy="304800"/>
           </a:xfrm>
           <a:prstGeom prst="rect">
             <a:avLst/>
@@ -6696,8 +6696,8 @@
         </p:nvSpPr>
         <p:spPr>
           <a:xfrm>
-            <a:off x="4699000" y="254000"/>
-            <a:ext cx="4445000" cy="254000"/>
+            <a:off x="4445000" y="254000"/>
+            <a:ext cx="4445000" cy="304800"/>
           </a:xfrm>
           <a:prstGeom prst="rect">
             <a:avLst/>
@@ -6734,8 +6734,8 @@
         </p:nvSpPr>
         <p:spPr>
           <a:xfrm>
-            <a:off x="3048000" y="508000"/>
-            <a:ext cx="1651000" cy="254000"/>
+            <a:off x="2984500" y="558800"/>
+            <a:ext cx="1460500" cy="304800"/>
           </a:xfrm>
           <a:prstGeom prst="rect">
             <a:avLst/>
@@ -6771,8 +6771,8 @@
         </p:nvSpPr>
         <p:spPr>
           <a:xfrm>
-            <a:off x="4699000" y="508000"/>
-            <a:ext cx="4445000" cy="254000"/>
+            <a:off x="4445000" y="558800"/>
+            <a:ext cx="4445000" cy="304800"/>
           </a:xfrm>
           <a:prstGeom prst="rect">
             <a:avLst/>
@@ -6808,8 +6808,8 @@
         </p:nvSpPr>
         <p:spPr>
           <a:xfrm>
-            <a:off x="3048000" y="762000"/>
-            <a:ext cx="1651000" cy="254000"/>
+            <a:off x="2984500" y="863600"/>
+            <a:ext cx="1460500" cy="304800"/>
           </a:xfrm>
           <a:prstGeom prst="rect">
             <a:avLst/>
@@ -6845,8 +6845,8 @@
         </p:nvSpPr>
         <p:spPr>
           <a:xfrm>
-            <a:off x="4699000" y="762000"/>
-            <a:ext cx="4445000" cy="254000"/>
+            <a:off x="4445000" y="863600"/>
+            <a:ext cx="4445000" cy="304800"/>
           </a:xfrm>
           <a:prstGeom prst="rect">
             <a:avLst/>
@@ -6882,8 +6882,8 @@
         </p:nvSpPr>
         <p:spPr>
           <a:xfrm>
-            <a:off x="3048000" y="1016000"/>
-            <a:ext cx="1651000" cy="254000"/>
+            <a:off x="2984500" y="1168400"/>
+            <a:ext cx="1460500" cy="304800"/>
           </a:xfrm>
           <a:prstGeom prst="rect">
             <a:avLst/>
@@ -6919,8 +6919,8 @@
         </p:nvSpPr>
         <p:spPr>
           <a:xfrm>
-            <a:off x="4699000" y="1016000"/>
-            <a:ext cx="4445000" cy="254000"/>
+            <a:off x="4445000" y="1168400"/>
+            <a:ext cx="4445000" cy="304800"/>
           </a:xfrm>
           <a:prstGeom prst="rect">
             <a:avLst/>
@@ -6956,8 +6956,8 @@
         </p:nvSpPr>
         <p:spPr>
           <a:xfrm>
-            <a:off x="3048000" y="1270000"/>
-            <a:ext cx="1651000" cy="254000"/>
+            <a:off x="2984500" y="1473200"/>
+            <a:ext cx="1460500" cy="304800"/>
           </a:xfrm>
           <a:prstGeom prst="rect">
             <a:avLst/>
@@ -6993,8 +6993,8 @@
         </p:nvSpPr>
         <p:spPr>
           <a:xfrm>
-            <a:off x="4699000" y="1270000"/>
-            <a:ext cx="4445000" cy="254000"/>
+            <a:off x="4445000" y="1473200"/>
+            <a:ext cx="4445000" cy="304800"/>
           </a:xfrm>
           <a:prstGeom prst="rect">
             <a:avLst/>
@@ -7030,8 +7030,8 @@
         </p:nvSpPr>
         <p:spPr>
           <a:xfrm>
-            <a:off x="3048000" y="1524000"/>
-            <a:ext cx="1651000" cy="254000"/>
+            <a:off x="2984500" y="1778000"/>
+            <a:ext cx="1460500" cy="304800"/>
           </a:xfrm>
           <a:prstGeom prst="rect">
             <a:avLst/>
@@ -7067,8 +7067,8 @@
         </p:nvSpPr>
         <p:spPr>
           <a:xfrm>
-            <a:off x="4699000" y="1524000"/>
-            <a:ext cx="4445000" cy="254000"/>
+            <a:off x="4445000" y="1778000"/>
+            <a:ext cx="4445000" cy="304800"/>
           </a:xfrm>
           <a:prstGeom prst="rect">
             <a:avLst/>
@@ -7104,8 +7104,8 @@
         </p:nvSpPr>
         <p:spPr>
           <a:xfrm>
-            <a:off x="3048000" y="1778000"/>
-            <a:ext cx="1651000" cy="254000"/>
+            <a:off x="2984500" y="2082800"/>
+            <a:ext cx="1460500" cy="304800"/>
           </a:xfrm>
           <a:prstGeom prst="rect">
             <a:avLst/>
@@ -7141,8 +7141,8 @@
         </p:nvSpPr>
         <p:spPr>
           <a:xfrm>
-            <a:off x="4699000" y="1778000"/>
-            <a:ext cx="4445000" cy="254000"/>
+            <a:off x="4445000" y="2082800"/>
+            <a:ext cx="4445000" cy="304800"/>
           </a:xfrm>
           <a:prstGeom prst="rect">
             <a:avLst/>
@@ -7178,8 +7178,8 @@
         </p:nvSpPr>
         <p:spPr>
           <a:xfrm>
-            <a:off x="3048000" y="2032000"/>
-            <a:ext cx="1651000" cy="254000"/>
+            <a:off x="2984500" y="2387600"/>
+            <a:ext cx="1460500" cy="304800"/>
           </a:xfrm>
           <a:prstGeom prst="rect">
             <a:avLst/>
@@ -7215,8 +7215,8 @@
         </p:nvSpPr>
         <p:spPr>
           <a:xfrm>
-            <a:off x="4699000" y="2032000"/>
-            <a:ext cx="4445000" cy="254000"/>
+            <a:off x="4445000" y="2387600"/>
+            <a:ext cx="4445000" cy="304800"/>
           </a:xfrm>
           <a:prstGeom prst="rect">
             <a:avLst/>
@@ -7252,8 +7252,8 @@
         </p:nvSpPr>
         <p:spPr>
           <a:xfrm>
-            <a:off x="3048000" y="2286000"/>
-            <a:ext cx="1651000" cy="254000"/>
+            <a:off x="2984500" y="2692400"/>
+            <a:ext cx="1460500" cy="304800"/>
           </a:xfrm>
           <a:prstGeom prst="rect">
             <a:avLst/>
@@ -7289,8 +7289,8 @@
         </p:nvSpPr>
         <p:spPr>
           <a:xfrm>
-            <a:off x="4699000" y="2286000"/>
-            <a:ext cx="4445000" cy="254000"/>
+            <a:off x="4445000" y="2692400"/>
+            <a:ext cx="4445000" cy="304800"/>
           </a:xfrm>
           <a:prstGeom prst="rect">
             <a:avLst/>
@@ -7351,8 +7351,8 @@
         </p:nvSpPr>
         <p:spPr>
           <a:xfrm>
-            <a:off x="3048000" y="254000"/>
-            <a:ext cx="1651000" cy="254000"/>
+            <a:off x="2984500" y="254000"/>
+            <a:ext cx="1460500" cy="304800"/>
           </a:xfrm>
           <a:prstGeom prst="rect">
             <a:avLst/>
@@ -7388,8 +7388,8 @@
         </p:nvSpPr>
         <p:spPr>
           <a:xfrm>
-            <a:off x="4699000" y="254000"/>
-            <a:ext cx="4445000" cy="254000"/>
+            <a:off x="4445000" y="254000"/>
+            <a:ext cx="4445000" cy="304800"/>
           </a:xfrm>
           <a:prstGeom prst="rect">
             <a:avLst/>
@@ -7426,8 +7426,8 @@
         </p:nvSpPr>
         <p:spPr>
           <a:xfrm>
-            <a:off x="3048000" y="508000"/>
-            <a:ext cx="1651000" cy="254000"/>
+            <a:off x="2984500" y="558800"/>
+            <a:ext cx="1460500" cy="304800"/>
           </a:xfrm>
           <a:prstGeom prst="rect">
             <a:avLst/>
@@ -7463,8 +7463,8 @@
         </p:nvSpPr>
         <p:spPr>
           <a:xfrm>
-            <a:off x="4699000" y="508000"/>
-            <a:ext cx="4445000" cy="254000"/>
+            <a:off x="4445000" y="558800"/>
+            <a:ext cx="4445000" cy="304800"/>
           </a:xfrm>
           <a:prstGeom prst="rect">
             <a:avLst/>
@@ -7500,8 +7500,8 @@
         </p:nvSpPr>
         <p:spPr>
           <a:xfrm>
-            <a:off x="3048000" y="762000"/>
-            <a:ext cx="1651000" cy="254000"/>
+            <a:off x="2984500" y="863600"/>
+            <a:ext cx="1460500" cy="304800"/>
           </a:xfrm>
           <a:prstGeom prst="rect">
             <a:avLst/>
@@ -7537,8 +7537,8 @@
         </p:nvSpPr>
         <p:spPr>
           <a:xfrm>
-            <a:off x="4699000" y="762000"/>
-            <a:ext cx="4445000" cy="254000"/>
+            <a:off x="4445000" y="863600"/>
+            <a:ext cx="4445000" cy="304800"/>
           </a:xfrm>
           <a:prstGeom prst="rect">
             <a:avLst/>
@@ -7574,8 +7574,8 @@
         </p:nvSpPr>
         <p:spPr>
           <a:xfrm>
-            <a:off x="3048000" y="1016000"/>
-            <a:ext cx="1651000" cy="254000"/>
+            <a:off x="2984500" y="1168400"/>
+            <a:ext cx="1460500" cy="304800"/>
           </a:xfrm>
           <a:prstGeom prst="rect">
             <a:avLst/>
@@ -7611,8 +7611,8 @@
         </p:nvSpPr>
         <p:spPr>
           <a:xfrm>
-            <a:off x="4699000" y="1016000"/>
-            <a:ext cx="4445000" cy="254000"/>
+            <a:off x="4445000" y="1168400"/>
+            <a:ext cx="4445000" cy="304800"/>
           </a:xfrm>
           <a:prstGeom prst="rect">
             <a:avLst/>
@@ -7648,8 +7648,8 @@
         </p:nvSpPr>
         <p:spPr>
           <a:xfrm>
-            <a:off x="3048000" y="1270000"/>
-            <a:ext cx="1651000" cy="254000"/>
+            <a:off x="2984500" y="1473200"/>
+            <a:ext cx="1460500" cy="304800"/>
           </a:xfrm>
           <a:prstGeom prst="rect">
             <a:avLst/>
@@ -7685,8 +7685,8 @@
         </p:nvSpPr>
         <p:spPr>
           <a:xfrm>
-            <a:off x="4699000" y="1270000"/>
-            <a:ext cx="4445000" cy="254000"/>
+            <a:off x="4445000" y="1473200"/>
+            <a:ext cx="4445000" cy="304800"/>
           </a:xfrm>
           <a:prstGeom prst="rect">
             <a:avLst/>
@@ -7722,8 +7722,8 @@
         </p:nvSpPr>
         <p:spPr>
           <a:xfrm>
-            <a:off x="3048000" y="1524000"/>
-            <a:ext cx="1651000" cy="254000"/>
+            <a:off x="2984500" y="1778000"/>
+            <a:ext cx="1460500" cy="304800"/>
           </a:xfrm>
           <a:prstGeom prst="rect">
             <a:avLst/>
@@ -7759,8 +7759,8 @@
         </p:nvSpPr>
         <p:spPr>
           <a:xfrm>
-            <a:off x="4699000" y="1524000"/>
-            <a:ext cx="4445000" cy="254000"/>
+            <a:off x="4445000" y="1778000"/>
+            <a:ext cx="4445000" cy="304800"/>
           </a:xfrm>
           <a:prstGeom prst="rect">
             <a:avLst/>
@@ -7796,8 +7796,8 @@
         </p:nvSpPr>
         <p:spPr>
           <a:xfrm>
-            <a:off x="3048000" y="1778000"/>
-            <a:ext cx="1651000" cy="254000"/>
+            <a:off x="2984500" y="2082800"/>
+            <a:ext cx="1460500" cy="304800"/>
           </a:xfrm>
           <a:prstGeom prst="rect">
             <a:avLst/>
@@ -7833,8 +7833,8 @@
         </p:nvSpPr>
         <p:spPr>
           <a:xfrm>
-            <a:off x="4699000" y="1778000"/>
-            <a:ext cx="4445000" cy="254000"/>
+            <a:off x="4445000" y="2082800"/>
+            <a:ext cx="4445000" cy="304800"/>
           </a:xfrm>
           <a:prstGeom prst="rect">
             <a:avLst/>
@@ -7870,8 +7870,8 @@
         </p:nvSpPr>
         <p:spPr>
           <a:xfrm>
-            <a:off x="3048000" y="2032000"/>
-            <a:ext cx="1651000" cy="254000"/>
+            <a:off x="2984500" y="2387600"/>
+            <a:ext cx="1460500" cy="304800"/>
           </a:xfrm>
           <a:prstGeom prst="rect">
             <a:avLst/>
@@ -7907,8 +7907,8 @@
         </p:nvSpPr>
         <p:spPr>
           <a:xfrm>
-            <a:off x="4699000" y="2032000"/>
-            <a:ext cx="4445000" cy="254000"/>
+            <a:off x="4445000" y="2387600"/>
+            <a:ext cx="4445000" cy="304800"/>
           </a:xfrm>
           <a:prstGeom prst="rect">
             <a:avLst/>
@@ -7944,8 +7944,8 @@
         </p:nvSpPr>
         <p:spPr>
           <a:xfrm>
-            <a:off x="3048000" y="2286000"/>
-            <a:ext cx="1651000" cy="254000"/>
+            <a:off x="2984500" y="2692400"/>
+            <a:ext cx="1460500" cy="304800"/>
           </a:xfrm>
           <a:prstGeom prst="rect">
             <a:avLst/>
@@ -7981,8 +7981,8 @@
         </p:nvSpPr>
         <p:spPr>
           <a:xfrm>
-            <a:off x="4699000" y="2286000"/>
-            <a:ext cx="4445000" cy="254000"/>
+            <a:off x="4445000" y="2692400"/>
+            <a:ext cx="4445000" cy="304800"/>
           </a:xfrm>
           <a:prstGeom prst="rect">
             <a:avLst/>
@@ -8043,8 +8043,8 @@
         </p:nvSpPr>
         <p:spPr>
           <a:xfrm>
-            <a:off x="3048000" y="254000"/>
-            <a:ext cx="1651000" cy="254000"/>
+            <a:off x="2984500" y="254000"/>
+            <a:ext cx="1460500" cy="304800"/>
           </a:xfrm>
           <a:prstGeom prst="rect">
             <a:avLst/>
@@ -8080,8 +8080,8 @@
         </p:nvSpPr>
         <p:spPr>
           <a:xfrm>
-            <a:off x="4699000" y="254000"/>
-            <a:ext cx="4445000" cy="254000"/>
+            <a:off x="4445000" y="254000"/>
+            <a:ext cx="4445000" cy="304800"/>
           </a:xfrm>
           <a:prstGeom prst="rect">
             <a:avLst/>
@@ -8118,8 +8118,8 @@
         </p:nvSpPr>
         <p:spPr>
           <a:xfrm>
-            <a:off x="3048000" y="508000"/>
-            <a:ext cx="1651000" cy="254000"/>
+            <a:off x="2984500" y="558800"/>
+            <a:ext cx="1460500" cy="304800"/>
           </a:xfrm>
           <a:prstGeom prst="rect">
             <a:avLst/>
@@ -8155,8 +8155,8 @@
         </p:nvSpPr>
         <p:spPr>
           <a:xfrm>
-            <a:off x="4699000" y="508000"/>
-            <a:ext cx="4445000" cy="254000"/>
+            <a:off x="4445000" y="558800"/>
+            <a:ext cx="4445000" cy="304800"/>
           </a:xfrm>
           <a:prstGeom prst="rect">
             <a:avLst/>
@@ -8192,8 +8192,8 @@
         </p:nvSpPr>
         <p:spPr>
           <a:xfrm>
-            <a:off x="3048000" y="762000"/>
-            <a:ext cx="1651000" cy="254000"/>
+            <a:off x="2984500" y="863600"/>
+            <a:ext cx="1460500" cy="304800"/>
           </a:xfrm>
           <a:prstGeom prst="rect">
             <a:avLst/>
@@ -8229,8 +8229,8 @@
         </p:nvSpPr>
         <p:spPr>
           <a:xfrm>
-            <a:off x="4699000" y="762000"/>
-            <a:ext cx="4445000" cy="254000"/>
+            <a:off x="4445000" y="863600"/>
+            <a:ext cx="4445000" cy="304800"/>
           </a:xfrm>
           <a:prstGeom prst="rect">
             <a:avLst/>
@@ -8266,8 +8266,8 @@
         </p:nvSpPr>
         <p:spPr>
           <a:xfrm>
-            <a:off x="3048000" y="1016000"/>
-            <a:ext cx="1651000" cy="254000"/>
+            <a:off x="2984500" y="1168400"/>
+            <a:ext cx="1460500" cy="304800"/>
           </a:xfrm>
           <a:prstGeom prst="rect">
             <a:avLst/>
@@ -8303,8 +8303,8 @@
         </p:nvSpPr>
         <p:spPr>
           <a:xfrm>
-            <a:off x="4699000" y="1016000"/>
-            <a:ext cx="4445000" cy="254000"/>
+            <a:off x="4445000" y="1168400"/>
+            <a:ext cx="4445000" cy="304800"/>
           </a:xfrm>
           <a:prstGeom prst="rect">
             <a:avLst/>
@@ -8340,8 +8340,8 @@
         </p:nvSpPr>
         <p:spPr>
           <a:xfrm>
-            <a:off x="3048000" y="1270000"/>
-            <a:ext cx="1651000" cy="254000"/>
+            <a:off x="2984500" y="1473200"/>
+            <a:ext cx="1460500" cy="304800"/>
           </a:xfrm>
           <a:prstGeom prst="rect">
             <a:avLst/>
@@ -8377,8 +8377,8 @@
         </p:nvSpPr>
         <p:spPr>
           <a:xfrm>
-            <a:off x="4699000" y="1270000"/>
-            <a:ext cx="4445000" cy="254000"/>
+            <a:off x="4445000" y="1473200"/>
+            <a:ext cx="4445000" cy="304800"/>
           </a:xfrm>
           <a:prstGeom prst="rect">
             <a:avLst/>
@@ -8414,8 +8414,8 @@
         </p:nvSpPr>
         <p:spPr>
           <a:xfrm>
-            <a:off x="3048000" y="1524000"/>
-            <a:ext cx="1651000" cy="254000"/>
+            <a:off x="2984500" y="1778000"/>
+            <a:ext cx="1460500" cy="304800"/>
           </a:xfrm>
           <a:prstGeom prst="rect">
             <a:avLst/>
@@ -8451,8 +8451,8 @@
         </p:nvSpPr>
         <p:spPr>
           <a:xfrm>
-            <a:off x="4699000" y="1524000"/>
-            <a:ext cx="4445000" cy="254000"/>
+            <a:off x="4445000" y="1778000"/>
+            <a:ext cx="4445000" cy="304800"/>
           </a:xfrm>
           <a:prstGeom prst="rect">
             <a:avLst/>
@@ -8488,8 +8488,8 @@
         </p:nvSpPr>
         <p:spPr>
           <a:xfrm>
-            <a:off x="3048000" y="1778000"/>
-            <a:ext cx="1651000" cy="254000"/>
+            <a:off x="2984500" y="2082800"/>
+            <a:ext cx="1460500" cy="304800"/>
           </a:xfrm>
           <a:prstGeom prst="rect">
             <a:avLst/>
@@ -8525,8 +8525,8 @@
         </p:nvSpPr>
         <p:spPr>
           <a:xfrm>
-            <a:off x="4699000" y="1778000"/>
-            <a:ext cx="4445000" cy="254000"/>
+            <a:off x="4445000" y="2082800"/>
+            <a:ext cx="4445000" cy="304800"/>
           </a:xfrm>
           <a:prstGeom prst="rect">
             <a:avLst/>
@@ -8562,8 +8562,8 @@
         </p:nvSpPr>
         <p:spPr>
           <a:xfrm>
-            <a:off x="3048000" y="2032000"/>
-            <a:ext cx="1651000" cy="254000"/>
+            <a:off x="2984500" y="2387600"/>
+            <a:ext cx="1460500" cy="304800"/>
           </a:xfrm>
           <a:prstGeom prst="rect">
             <a:avLst/>
@@ -8599,8 +8599,8 @@
         </p:nvSpPr>
         <p:spPr>
           <a:xfrm>
-            <a:off x="4699000" y="2032000"/>
-            <a:ext cx="4445000" cy="254000"/>
+            <a:off x="4445000" y="2387600"/>
+            <a:ext cx="4445000" cy="304800"/>
           </a:xfrm>
           <a:prstGeom prst="rect">
             <a:avLst/>
@@ -8636,8 +8636,8 @@
         </p:nvSpPr>
         <p:spPr>
           <a:xfrm>
-            <a:off x="3048000" y="2286000"/>
-            <a:ext cx="1651000" cy="254000"/>
+            <a:off x="2984500" y="2692400"/>
+            <a:ext cx="1460500" cy="304800"/>
           </a:xfrm>
           <a:prstGeom prst="rect">
             <a:avLst/>
@@ -8673,8 +8673,8 @@
         </p:nvSpPr>
         <p:spPr>
           <a:xfrm>
-            <a:off x="4699000" y="2286000"/>
-            <a:ext cx="4445000" cy="254000"/>
+            <a:off x="4445000" y="2692400"/>
+            <a:ext cx="4445000" cy="304800"/>
           </a:xfrm>
           <a:prstGeom prst="rect">
             <a:avLst/>
@@ -8735,8 +8735,8 @@
         </p:nvSpPr>
         <p:spPr>
           <a:xfrm>
-            <a:off x="3048000" y="254000"/>
-            <a:ext cx="1651000" cy="254000"/>
+            <a:off x="2984500" y="254000"/>
+            <a:ext cx="1460500" cy="304800"/>
           </a:xfrm>
           <a:prstGeom prst="rect">
             <a:avLst/>
@@ -8772,8 +8772,8 @@
         </p:nvSpPr>
         <p:spPr>
           <a:xfrm>
-            <a:off x="4699000" y="254000"/>
-            <a:ext cx="4445000" cy="254000"/>
+            <a:off x="4445000" y="254000"/>
+            <a:ext cx="4445000" cy="304800"/>
           </a:xfrm>
           <a:prstGeom prst="rect">
             <a:avLst/>
@@ -8810,8 +8810,8 @@
         </p:nvSpPr>
         <p:spPr>
           <a:xfrm>
-            <a:off x="3048000" y="508000"/>
-            <a:ext cx="1651000" cy="254000"/>
+            <a:off x="2984500" y="558800"/>
+            <a:ext cx="1460500" cy="304800"/>
           </a:xfrm>
           <a:prstGeom prst="rect">
             <a:avLst/>
@@ -8847,8 +8847,8 @@
         </p:nvSpPr>
         <p:spPr>
           <a:xfrm>
-            <a:off x="4699000" y="508000"/>
-            <a:ext cx="4445000" cy="254000"/>
+            <a:off x="4445000" y="558800"/>
+            <a:ext cx="4445000" cy="304800"/>
           </a:xfrm>
           <a:prstGeom prst="rect">
             <a:avLst/>
@@ -8884,8 +8884,8 @@
         </p:nvSpPr>
         <p:spPr>
           <a:xfrm>
-            <a:off x="3048000" y="762000"/>
-            <a:ext cx="1651000" cy="254000"/>
+            <a:off x="2984500" y="863600"/>
+            <a:ext cx="1460500" cy="304800"/>
           </a:xfrm>
           <a:prstGeom prst="rect">
             <a:avLst/>
@@ -8921,8 +8921,8 @@
         </p:nvSpPr>
         <p:spPr>
           <a:xfrm>
-            <a:off x="4699000" y="762000"/>
-            <a:ext cx="4445000" cy="254000"/>
+            <a:off x="4445000" y="863600"/>
+            <a:ext cx="4445000" cy="304800"/>
           </a:xfrm>
           <a:prstGeom prst="rect">
             <a:avLst/>
@@ -8958,8 +8958,8 @@
         </p:nvSpPr>
         <p:spPr>
           <a:xfrm>
-            <a:off x="3048000" y="1016000"/>
-            <a:ext cx="1651000" cy="254000"/>
+            <a:off x="2984500" y="1168400"/>
+            <a:ext cx="1460500" cy="304800"/>
           </a:xfrm>
           <a:prstGeom prst="rect">
             <a:avLst/>
@@ -8995,8 +8995,8 @@
         </p:nvSpPr>
         <p:spPr>
           <a:xfrm>
-            <a:off x="4699000" y="1016000"/>
-            <a:ext cx="4445000" cy="254000"/>
+            <a:off x="4445000" y="1168400"/>
+            <a:ext cx="4445000" cy="304800"/>
           </a:xfrm>
           <a:prstGeom prst="rect">
             <a:avLst/>
@@ -9032,8 +9032,8 @@
         </p:nvSpPr>
         <p:spPr>
           <a:xfrm>
-            <a:off x="3048000" y="1270000"/>
-            <a:ext cx="1651000" cy="254000"/>
+            <a:off x="2984500" y="1473200"/>
+            <a:ext cx="1460500" cy="304800"/>
           </a:xfrm>
           <a:prstGeom prst="rect">
             <a:avLst/>
@@ -9069,8 +9069,8 @@
         </p:nvSpPr>
         <p:spPr>
           <a:xfrm>
-            <a:off x="4699000" y="1270000"/>
-            <a:ext cx="4445000" cy="254000"/>
+            <a:off x="4445000" y="1473200"/>
+            <a:ext cx="4445000" cy="304800"/>
           </a:xfrm>
           <a:prstGeom prst="rect">
             <a:avLst/>
@@ -9106,8 +9106,8 @@
         </p:nvSpPr>
         <p:spPr>
           <a:xfrm>
-            <a:off x="3048000" y="1524000"/>
-            <a:ext cx="1651000" cy="254000"/>
+            <a:off x="2984500" y="1778000"/>
+            <a:ext cx="1460500" cy="304800"/>
           </a:xfrm>
           <a:prstGeom prst="rect">
             <a:avLst/>
@@ -9143,8 +9143,8 @@
         </p:nvSpPr>
         <p:spPr>
           <a:xfrm>
-            <a:off x="4699000" y="1524000"/>
-            <a:ext cx="4445000" cy="254000"/>
+            <a:off x="4445000" y="1778000"/>
+            <a:ext cx="4445000" cy="304800"/>
           </a:xfrm>
           <a:prstGeom prst="rect">
             <a:avLst/>
@@ -9180,8 +9180,8 @@
         </p:nvSpPr>
         <p:spPr>
           <a:xfrm>
-            <a:off x="3048000" y="1778000"/>
-            <a:ext cx="1651000" cy="254000"/>
+            <a:off x="2984500" y="2082800"/>
+            <a:ext cx="1460500" cy="304800"/>
           </a:xfrm>
           <a:prstGeom prst="rect">
             <a:avLst/>
@@ -9217,8 +9217,8 @@
         </p:nvSpPr>
         <p:spPr>
           <a:xfrm>
-            <a:off x="4699000" y="1778000"/>
-            <a:ext cx="4445000" cy="254000"/>
+            <a:off x="4445000" y="2082800"/>
+            <a:ext cx="4445000" cy="304800"/>
           </a:xfrm>
           <a:prstGeom prst="rect">
             <a:avLst/>
@@ -9254,8 +9254,8 @@
         </p:nvSpPr>
         <p:spPr>
           <a:xfrm>
-            <a:off x="3048000" y="2032000"/>
-            <a:ext cx="1651000" cy="254000"/>
+            <a:off x="2984500" y="2387600"/>
+            <a:ext cx="1460500" cy="304800"/>
           </a:xfrm>
           <a:prstGeom prst="rect">
             <a:avLst/>
@@ -9291,8 +9291,8 @@
         </p:nvSpPr>
         <p:spPr>
           <a:xfrm>
-            <a:off x="4699000" y="2032000"/>
-            <a:ext cx="4445000" cy="254000"/>
+            <a:off x="4445000" y="2387600"/>
+            <a:ext cx="4445000" cy="304800"/>
           </a:xfrm>
           <a:prstGeom prst="rect">
             <a:avLst/>
@@ -9328,8 +9328,8 @@
         </p:nvSpPr>
         <p:spPr>
           <a:xfrm>
-            <a:off x="3048000" y="2286000"/>
-            <a:ext cx="1651000" cy="254000"/>
+            <a:off x="2984500" y="2692400"/>
+            <a:ext cx="1460500" cy="304800"/>
           </a:xfrm>
           <a:prstGeom prst="rect">
             <a:avLst/>
@@ -9365,8 +9365,8 @@
         </p:nvSpPr>
         <p:spPr>
           <a:xfrm>
-            <a:off x="4699000" y="2286000"/>
-            <a:ext cx="4445000" cy="254000"/>
+            <a:off x="4445000" y="2692400"/>
+            <a:ext cx="4445000" cy="304800"/>
           </a:xfrm>
           <a:prstGeom prst="rect">
             <a:avLst/>
@@ -9427,8 +9427,8 @@
         </p:nvSpPr>
         <p:spPr>
           <a:xfrm>
-            <a:off x="3048000" y="254000"/>
-            <a:ext cx="1651000" cy="254000"/>
+            <a:off x="2984500" y="254000"/>
+            <a:ext cx="1460500" cy="304800"/>
           </a:xfrm>
           <a:prstGeom prst="rect">
             <a:avLst/>
@@ -9464,8 +9464,8 @@
         </p:nvSpPr>
         <p:spPr>
           <a:xfrm>
-            <a:off x="4699000" y="254000"/>
-            <a:ext cx="4445000" cy="254000"/>
+            <a:off x="4445000" y="254000"/>
+            <a:ext cx="4445000" cy="304800"/>
           </a:xfrm>
           <a:prstGeom prst="rect">
             <a:avLst/>
@@ -9502,8 +9502,8 @@
         </p:nvSpPr>
         <p:spPr>
           <a:xfrm>
-            <a:off x="3048000" y="508000"/>
-            <a:ext cx="1651000" cy="254000"/>
+            <a:off x="2984500" y="558800"/>
+            <a:ext cx="1460500" cy="304800"/>
           </a:xfrm>
           <a:prstGeom prst="rect">
             <a:avLst/>
@@ -9539,8 +9539,8 @@
         </p:nvSpPr>
         <p:spPr>
           <a:xfrm>
-            <a:off x="4699000" y="508000"/>
-            <a:ext cx="4445000" cy="254000"/>
+            <a:off x="4445000" y="558800"/>
+            <a:ext cx="4445000" cy="304800"/>
           </a:xfrm>
           <a:prstGeom prst="rect">
             <a:avLst/>
@@ -9576,8 +9576,8 @@
         </p:nvSpPr>
         <p:spPr>
           <a:xfrm>
-            <a:off x="3048000" y="762000"/>
-            <a:ext cx="1651000" cy="254000"/>
+            <a:off x="2984500" y="863600"/>
+            <a:ext cx="1460500" cy="304800"/>
           </a:xfrm>
           <a:prstGeom prst="rect">
             <a:avLst/>
@@ -9613,8 +9613,8 @@
         </p:nvSpPr>
         <p:spPr>
           <a:xfrm>
-            <a:off x="4699000" y="762000"/>
-            <a:ext cx="4445000" cy="254000"/>
+            <a:off x="4445000" y="863600"/>
+            <a:ext cx="4445000" cy="304800"/>
           </a:xfrm>
           <a:prstGeom prst="rect">
             <a:avLst/>
@@ -9650,8 +9650,8 @@
         </p:nvSpPr>
         <p:spPr>
           <a:xfrm>
-            <a:off x="3048000" y="1016000"/>
-            <a:ext cx="1651000" cy="254000"/>
+            <a:off x="2984500" y="1168400"/>
+            <a:ext cx="1460500" cy="304800"/>
           </a:xfrm>
           <a:prstGeom prst="rect">
             <a:avLst/>
@@ -9687,8 +9687,8 @@
         </p:nvSpPr>
         <p:spPr>
           <a:xfrm>
-            <a:off x="4699000" y="1016000"/>
-            <a:ext cx="4445000" cy="254000"/>
+            <a:off x="4445000" y="1168400"/>
+            <a:ext cx="4445000" cy="304800"/>
           </a:xfrm>
           <a:prstGeom prst="rect">
             <a:avLst/>
@@ -9724,8 +9724,8 @@
         </p:nvSpPr>
         <p:spPr>
           <a:xfrm>
-            <a:off x="3048000" y="1270000"/>
-            <a:ext cx="1651000" cy="254000"/>
+            <a:off x="2984500" y="1473200"/>
+            <a:ext cx="1460500" cy="304800"/>
           </a:xfrm>
           <a:prstGeom prst="rect">
             <a:avLst/>
@@ -9761,8 +9761,8 @@
         </p:nvSpPr>
         <p:spPr>
           <a:xfrm>
-            <a:off x="4699000" y="1270000"/>
-            <a:ext cx="4445000" cy="254000"/>
+            <a:off x="4445000" y="1473200"/>
+            <a:ext cx="4445000" cy="304800"/>
           </a:xfrm>
           <a:prstGeom prst="rect">
             <a:avLst/>
@@ -9798,8 +9798,8 @@
         </p:nvSpPr>
         <p:spPr>
           <a:xfrm>
-            <a:off x="3048000" y="1524000"/>
-            <a:ext cx="1651000" cy="254000"/>
+            <a:off x="2984500" y="1778000"/>
+            <a:ext cx="1460500" cy="304800"/>
           </a:xfrm>
           <a:prstGeom prst="rect">
             <a:avLst/>
@@ -9835,8 +9835,8 @@
         </p:nvSpPr>
         <p:spPr>
           <a:xfrm>
-            <a:off x="4699000" y="1524000"/>
-            <a:ext cx="4445000" cy="254000"/>
+            <a:off x="4445000" y="1778000"/>
+            <a:ext cx="4445000" cy="304800"/>
           </a:xfrm>
           <a:prstGeom prst="rect">
             <a:avLst/>
@@ -9872,8 +9872,8 @@
         </p:nvSpPr>
         <p:spPr>
           <a:xfrm>
-            <a:off x="3048000" y="1778000"/>
-            <a:ext cx="1651000" cy="254000"/>
+            <a:off x="2984500" y="2082800"/>
+            <a:ext cx="1460500" cy="304800"/>
           </a:xfrm>
           <a:prstGeom prst="rect">
             <a:avLst/>
@@ -9909,8 +9909,8 @@
         </p:nvSpPr>
         <p:spPr>
           <a:xfrm>
-            <a:off x="4699000" y="1778000"/>
-            <a:ext cx="4445000" cy="254000"/>
+            <a:off x="4445000" y="2082800"/>
+            <a:ext cx="4445000" cy="304800"/>
           </a:xfrm>
           <a:prstGeom prst="rect">
             <a:avLst/>
@@ -9946,8 +9946,8 @@
         </p:nvSpPr>
         <p:spPr>
           <a:xfrm>
-            <a:off x="3048000" y="2032000"/>
-            <a:ext cx="1651000" cy="254000"/>
+            <a:off x="2984500" y="2387600"/>
+            <a:ext cx="1460500" cy="304800"/>
           </a:xfrm>
           <a:prstGeom prst="rect">
             <a:avLst/>
@@ -9983,8 +9983,8 @@
         </p:nvSpPr>
         <p:spPr>
           <a:xfrm>
-            <a:off x="4699000" y="2032000"/>
-            <a:ext cx="4445000" cy="254000"/>
+            <a:off x="4445000" y="2387600"/>
+            <a:ext cx="4445000" cy="304800"/>
           </a:xfrm>
           <a:prstGeom prst="rect">
             <a:avLst/>
@@ -10020,8 +10020,8 @@
         </p:nvSpPr>
         <p:spPr>
           <a:xfrm>
-            <a:off x="3048000" y="2286000"/>
-            <a:ext cx="1651000" cy="254000"/>
+            <a:off x="2984500" y="2692400"/>
+            <a:ext cx="1460500" cy="304800"/>
           </a:xfrm>
           <a:prstGeom prst="rect">
             <a:avLst/>
@@ -10057,8 +10057,8 @@
         </p:nvSpPr>
         <p:spPr>
           <a:xfrm>
-            <a:off x="4699000" y="2286000"/>
-            <a:ext cx="4445000" cy="254000"/>
+            <a:off x="4445000" y="2692400"/>
+            <a:ext cx="4445000" cy="304800"/>
           </a:xfrm>
           <a:prstGeom prst="rect">
             <a:avLst/>
@@ -10119,8 +10119,8 @@
         </p:nvSpPr>
         <p:spPr>
           <a:xfrm>
-            <a:off x="3048000" y="254000"/>
-            <a:ext cx="1651000" cy="254000"/>
+            <a:off x="2984500" y="254000"/>
+            <a:ext cx="1460500" cy="304800"/>
           </a:xfrm>
           <a:prstGeom prst="rect">
             <a:avLst/>
@@ -10156,8 +10156,8 @@
         </p:nvSpPr>
         <p:spPr>
           <a:xfrm>
-            <a:off x="4699000" y="254000"/>
-            <a:ext cx="4445000" cy="254000"/>
+            <a:off x="4445000" y="254000"/>
+            <a:ext cx="4445000" cy="304800"/>
           </a:xfrm>
           <a:prstGeom prst="rect">
             <a:avLst/>
@@ -10194,8 +10194,8 @@
         </p:nvSpPr>
         <p:spPr>
           <a:xfrm>
-            <a:off x="3048000" y="508000"/>
-            <a:ext cx="1651000" cy="254000"/>
+            <a:off x="2984500" y="558800"/>
+            <a:ext cx="1460500" cy="304800"/>
           </a:xfrm>
           <a:prstGeom prst="rect">
             <a:avLst/>
@@ -10231,8 +10231,8 @@
         </p:nvSpPr>
         <p:spPr>
           <a:xfrm>
-            <a:off x="4699000" y="508000"/>
-            <a:ext cx="4445000" cy="254000"/>
+            <a:off x="4445000" y="558800"/>
+            <a:ext cx="4445000" cy="304800"/>
           </a:xfrm>
           <a:prstGeom prst="rect">
             <a:avLst/>
@@ -10268,8 +10268,8 @@
         </p:nvSpPr>
         <p:spPr>
           <a:xfrm>
-            <a:off x="3048000" y="762000"/>
-            <a:ext cx="1651000" cy="254000"/>
+            <a:off x="2984500" y="863600"/>
+            <a:ext cx="1460500" cy="304800"/>
           </a:xfrm>
           <a:prstGeom prst="rect">
             <a:avLst/>
@@ -10305,8 +10305,8 @@
         </p:nvSpPr>
         <p:spPr>
           <a:xfrm>
-            <a:off x="4699000" y="762000"/>
-            <a:ext cx="4445000" cy="254000"/>
+            <a:off x="4445000" y="863600"/>
+            <a:ext cx="4445000" cy="304800"/>
           </a:xfrm>
           <a:prstGeom prst="rect">
             <a:avLst/>
@@ -10342,8 +10342,8 @@
         </p:nvSpPr>
         <p:spPr>
           <a:xfrm>
-            <a:off x="3048000" y="1016000"/>
-            <a:ext cx="1651000" cy="254000"/>
+            <a:off x="2984500" y="1168400"/>
+            <a:ext cx="1460500" cy="304800"/>
           </a:xfrm>
           <a:prstGeom prst="rect">
             <a:avLst/>
@@ -10379,8 +10379,8 @@
         </p:nvSpPr>
         <p:spPr>
           <a:xfrm>
-            <a:off x="4699000" y="1016000"/>
-            <a:ext cx="4445000" cy="254000"/>
+            <a:off x="4445000" y="1168400"/>
+            <a:ext cx="4445000" cy="304800"/>
           </a:xfrm>
           <a:prstGeom prst="rect">
             <a:avLst/>
@@ -10416,8 +10416,8 @@
         </p:nvSpPr>
         <p:spPr>
           <a:xfrm>
-            <a:off x="3048000" y="1270000"/>
-            <a:ext cx="1651000" cy="254000"/>
+            <a:off x="2984500" y="1473200"/>
+            <a:ext cx="1460500" cy="304800"/>
           </a:xfrm>
           <a:prstGeom prst="rect">
             <a:avLst/>
@@ -10453,8 +10453,8 @@
         </p:nvSpPr>
         <p:spPr>
           <a:xfrm>
-            <a:off x="4699000" y="1270000"/>
-            <a:ext cx="4445000" cy="254000"/>
+            <a:off x="4445000" y="1473200"/>
+            <a:ext cx="4445000" cy="304800"/>
           </a:xfrm>
           <a:prstGeom prst="rect">
             <a:avLst/>
@@ -10490,8 +10490,8 @@
         </p:nvSpPr>
         <p:spPr>
           <a:xfrm>
-            <a:off x="3048000" y="1524000"/>
-            <a:ext cx="1651000" cy="254000"/>
+            <a:off x="2984500" y="1778000"/>
+            <a:ext cx="1460500" cy="304800"/>
           </a:xfrm>
           <a:prstGeom prst="rect">
             <a:avLst/>
@@ -10527,8 +10527,8 @@
         </p:nvSpPr>
         <p:spPr>
           <a:xfrm>
-            <a:off x="4699000" y="1524000"/>
-            <a:ext cx="4445000" cy="254000"/>
+            <a:off x="4445000" y="1778000"/>
+            <a:ext cx="4445000" cy="304800"/>
           </a:xfrm>
           <a:prstGeom prst="rect">
             <a:avLst/>
@@ -10564,8 +10564,8 @@
         </p:nvSpPr>
         <p:spPr>
           <a:xfrm>
-            <a:off x="3048000" y="1778000"/>
-            <a:ext cx="1651000" cy="254000"/>
+            <a:off x="2984500" y="2082800"/>
+            <a:ext cx="1460500" cy="304800"/>
           </a:xfrm>
           <a:prstGeom prst="rect">
             <a:avLst/>
@@ -10601,8 +10601,8 @@
         </p:nvSpPr>
         <p:spPr>
           <a:xfrm>
-            <a:off x="4699000" y="1778000"/>
-            <a:ext cx="4445000" cy="254000"/>
+            <a:off x="4445000" y="2082800"/>
+            <a:ext cx="4445000" cy="304800"/>
           </a:xfrm>
           <a:prstGeom prst="rect">
             <a:avLst/>
@@ -10638,8 +10638,8 @@
         </p:nvSpPr>
         <p:spPr>
           <a:xfrm>
-            <a:off x="3048000" y="2032000"/>
-            <a:ext cx="1651000" cy="254000"/>
+            <a:off x="2984500" y="2387600"/>
+            <a:ext cx="1460500" cy="304800"/>
           </a:xfrm>
           <a:prstGeom prst="rect">
             <a:avLst/>
@@ -10675,8 +10675,8 @@
         </p:nvSpPr>
         <p:spPr>
           <a:xfrm>
-            <a:off x="4699000" y="2032000"/>
-            <a:ext cx="4445000" cy="254000"/>
+            <a:off x="4445000" y="2387600"/>
+            <a:ext cx="4445000" cy="304800"/>
           </a:xfrm>
           <a:prstGeom prst="rect">
             <a:avLst/>
@@ -10712,8 +10712,8 @@
         </p:nvSpPr>
         <p:spPr>
           <a:xfrm>
-            <a:off x="3048000" y="2286000"/>
-            <a:ext cx="1651000" cy="254000"/>
+            <a:off x="2984500" y="2692400"/>
+            <a:ext cx="1460500" cy="304800"/>
           </a:xfrm>
           <a:prstGeom prst="rect">
             <a:avLst/>
@@ -10749,8 +10749,8 @@
         </p:nvSpPr>
         <p:spPr>
           <a:xfrm>
-            <a:off x="4699000" y="2286000"/>
-            <a:ext cx="4445000" cy="254000"/>
+            <a:off x="4445000" y="2692400"/>
+            <a:ext cx="4445000" cy="304800"/>
           </a:xfrm>
           <a:prstGeom prst="rect">
             <a:avLst/>
@@ -10811,8 +10811,8 @@
         </p:nvSpPr>
         <p:spPr>
           <a:xfrm>
-            <a:off x="3048000" y="254000"/>
-            <a:ext cx="1651000" cy="254000"/>
+            <a:off x="2984500" y="254000"/>
+            <a:ext cx="1460500" cy="304800"/>
           </a:xfrm>
           <a:prstGeom prst="rect">
             <a:avLst/>
@@ -10848,8 +10848,8 @@
         </p:nvSpPr>
         <p:spPr>
           <a:xfrm>
-            <a:off x="4699000" y="254000"/>
-            <a:ext cx="4445000" cy="254000"/>
+            <a:off x="4445000" y="254000"/>
+            <a:ext cx="4445000" cy="304800"/>
           </a:xfrm>
           <a:prstGeom prst="rect">
             <a:avLst/>
@@ -10886,8 +10886,8 @@
         </p:nvSpPr>
         <p:spPr>
           <a:xfrm>
-            <a:off x="3048000" y="508000"/>
-            <a:ext cx="1651000" cy="254000"/>
+            <a:off x="2984500" y="558800"/>
+            <a:ext cx="1460500" cy="304800"/>
           </a:xfrm>
           <a:prstGeom prst="rect">
             <a:avLst/>
@@ -10923,8 +10923,8 @@
         </p:nvSpPr>
         <p:spPr>
           <a:xfrm>
-            <a:off x="4699000" y="508000"/>
-            <a:ext cx="4445000" cy="254000"/>
+            <a:off x="4445000" y="558800"/>
+            <a:ext cx="4445000" cy="304800"/>
           </a:xfrm>
           <a:prstGeom prst="rect">
             <a:avLst/>
@@ -10960,8 +10960,8 @@
         </p:nvSpPr>
         <p:spPr>
           <a:xfrm>
-            <a:off x="3048000" y="762000"/>
-            <a:ext cx="1651000" cy="254000"/>
+            <a:off x="2984500" y="863600"/>
+            <a:ext cx="1460500" cy="304800"/>
           </a:xfrm>
           <a:prstGeom prst="rect">
             <a:avLst/>
@@ -10997,8 +10997,8 @@
         </p:nvSpPr>
         <p:spPr>
           <a:xfrm>
-            <a:off x="4699000" y="762000"/>
-            <a:ext cx="4445000" cy="254000"/>
+            <a:off x="4445000" y="863600"/>
+            <a:ext cx="4445000" cy="304800"/>
           </a:xfrm>
           <a:prstGeom prst="rect">
             <a:avLst/>
@@ -11034,8 +11034,8 @@
         </p:nvSpPr>
         <p:spPr>
           <a:xfrm>
-            <a:off x="3048000" y="1016000"/>
-            <a:ext cx="1651000" cy="254000"/>
+            <a:off x="2984500" y="1168400"/>
+            <a:ext cx="1460500" cy="304800"/>
           </a:xfrm>
           <a:prstGeom prst="rect">
             <a:avLst/>
@@ -11071,8 +11071,8 @@
         </p:nvSpPr>
         <p:spPr>
           <a:xfrm>
-            <a:off x="4699000" y="1016000"/>
-            <a:ext cx="4445000" cy="254000"/>
+            <a:off x="4445000" y="1168400"/>
+            <a:ext cx="4445000" cy="304800"/>
           </a:xfrm>
           <a:prstGeom prst="rect">
             <a:avLst/>
@@ -11108,8 +11108,8 @@
         </p:nvSpPr>
         <p:spPr>
           <a:xfrm>
-            <a:off x="3048000" y="1270000"/>
-            <a:ext cx="1651000" cy="254000"/>
+            <a:off x="2984500" y="1473200"/>
+            <a:ext cx="1460500" cy="304800"/>
           </a:xfrm>
           <a:prstGeom prst="rect">
             <a:avLst/>
@@ -11145,8 +11145,8 @@
         </p:nvSpPr>
         <p:spPr>
           <a:xfrm>
-            <a:off x="4699000" y="1270000"/>
-            <a:ext cx="4445000" cy="254000"/>
+            <a:off x="4445000" y="1473200"/>
+            <a:ext cx="4445000" cy="304800"/>
           </a:xfrm>
           <a:prstGeom prst="rect">
             <a:avLst/>
@@ -11182,8 +11182,8 @@
         </p:nvSpPr>
         <p:spPr>
           <a:xfrm>
-            <a:off x="3048000" y="1524000"/>
-            <a:ext cx="1651000" cy="254000"/>
+            <a:off x="2984500" y="1778000"/>
+            <a:ext cx="1460500" cy="304800"/>
           </a:xfrm>
           <a:prstGeom prst="rect">
             <a:avLst/>
@@ -11219,8 +11219,8 @@
         </p:nvSpPr>
         <p:spPr>
           <a:xfrm>
-            <a:off x="4699000" y="1524000"/>
-            <a:ext cx="4445000" cy="254000"/>
+            <a:off x="4445000" y="1778000"/>
+            <a:ext cx="4445000" cy="304800"/>
           </a:xfrm>
           <a:prstGeom prst="rect">
             <a:avLst/>
@@ -11256,8 +11256,8 @@
         </p:nvSpPr>
         <p:spPr>
           <a:xfrm>
-            <a:off x="3048000" y="1778000"/>
-            <a:ext cx="1651000" cy="254000"/>
+            <a:off x="2984500" y="2082800"/>
+            <a:ext cx="1460500" cy="304800"/>
           </a:xfrm>
           <a:prstGeom prst="rect">
             <a:avLst/>
@@ -11293,8 +11293,8 @@
         </p:nvSpPr>
         <p:spPr>
           <a:xfrm>
-            <a:off x="4699000" y="1778000"/>
-            <a:ext cx="4445000" cy="254000"/>
+            <a:off x="4445000" y="2082800"/>
+            <a:ext cx="4445000" cy="304800"/>
           </a:xfrm>
           <a:prstGeom prst="rect">
             <a:avLst/>
@@ -11330,8 +11330,8 @@
         </p:nvSpPr>
         <p:spPr>
           <a:xfrm>
-            <a:off x="3048000" y="2032000"/>
-            <a:ext cx="1651000" cy="254000"/>
+            <a:off x="2984500" y="2387600"/>
+            <a:ext cx="1460500" cy="304800"/>
           </a:xfrm>
           <a:prstGeom prst="rect">
             <a:avLst/>
@@ -11367,8 +11367,8 @@
         </p:nvSpPr>
         <p:spPr>
           <a:xfrm>
-            <a:off x="4699000" y="2032000"/>
-            <a:ext cx="4445000" cy="254000"/>
+            <a:off x="4445000" y="2387600"/>
+            <a:ext cx="4445000" cy="304800"/>
           </a:xfrm>
           <a:prstGeom prst="rect">
             <a:avLst/>
@@ -11404,8 +11404,8 @@
         </p:nvSpPr>
         <p:spPr>
           <a:xfrm>
-            <a:off x="3048000" y="2286000"/>
-            <a:ext cx="1651000" cy="254000"/>
+            <a:off x="2984500" y="2692400"/>
+            <a:ext cx="1460500" cy="304800"/>
           </a:xfrm>
           <a:prstGeom prst="rect">
             <a:avLst/>
@@ -11441,8 +11441,8 @@
         </p:nvSpPr>
         <p:spPr>
           <a:xfrm>
-            <a:off x="4699000" y="2286000"/>
-            <a:ext cx="4445000" cy="254000"/>
+            <a:off x="4445000" y="2692400"/>
+            <a:ext cx="4445000" cy="304800"/>
           </a:xfrm>
           <a:prstGeom prst="rect">
             <a:avLst/>
@@ -11503,8 +11503,8 @@
         </p:nvSpPr>
         <p:spPr>
           <a:xfrm>
-            <a:off x="3048000" y="254000"/>
-            <a:ext cx="1651000" cy="254000"/>
+            <a:off x="2984500" y="254000"/>
+            <a:ext cx="1460500" cy="304800"/>
           </a:xfrm>
           <a:prstGeom prst="rect">
             <a:avLst/>
@@ -11540,8 +11540,8 @@
         </p:nvSpPr>
         <p:spPr>
           <a:xfrm>
-            <a:off x="4699000" y="254000"/>
-            <a:ext cx="4445000" cy="254000"/>
+            <a:off x="4445000" y="254000"/>
+            <a:ext cx="4445000" cy="304800"/>
           </a:xfrm>
           <a:prstGeom prst="rect">
             <a:avLst/>
@@ -11578,8 +11578,8 @@
         </p:nvSpPr>
         <p:spPr>
           <a:xfrm>
-            <a:off x="3048000" y="508000"/>
-            <a:ext cx="1651000" cy="254000"/>
+            <a:off x="2984500" y="558800"/>
+            <a:ext cx="1460500" cy="304800"/>
           </a:xfrm>
           <a:prstGeom prst="rect">
             <a:avLst/>
@@ -11615,8 +11615,8 @@
         </p:nvSpPr>
         <p:spPr>
           <a:xfrm>
-            <a:off x="4699000" y="508000"/>
-            <a:ext cx="4445000" cy="254000"/>
+            <a:off x="4445000" y="558800"/>
+            <a:ext cx="4445000" cy="304800"/>
           </a:xfrm>
           <a:prstGeom prst="rect">
             <a:avLst/>
@@ -11652,8 +11652,8 @@
         </p:nvSpPr>
         <p:spPr>
           <a:xfrm>
-            <a:off x="3048000" y="762000"/>
-            <a:ext cx="1651000" cy="254000"/>
+            <a:off x="2984500" y="863600"/>
+            <a:ext cx="1460500" cy="304800"/>
           </a:xfrm>
           <a:prstGeom prst="rect">
             <a:avLst/>
@@ -11689,8 +11689,8 @@
         </p:nvSpPr>
         <p:spPr>
           <a:xfrm>
-            <a:off x="4699000" y="762000"/>
-            <a:ext cx="4445000" cy="254000"/>
+            <a:off x="4445000" y="863600"/>
+            <a:ext cx="4445000" cy="304800"/>
           </a:xfrm>
           <a:prstGeom prst="rect">
             <a:avLst/>
@@ -11726,8 +11726,8 @@
         </p:nvSpPr>
         <p:spPr>
           <a:xfrm>
-            <a:off x="3048000" y="1016000"/>
-            <a:ext cx="1651000" cy="254000"/>
+            <a:off x="2984500" y="1168400"/>
+            <a:ext cx="1460500" cy="304800"/>
           </a:xfrm>
           <a:prstGeom prst="rect">
             <a:avLst/>
@@ -11763,8 +11763,8 @@
         </p:nvSpPr>
         <p:spPr>
           <a:xfrm>
-            <a:off x="4699000" y="1016000"/>
-            <a:ext cx="4445000" cy="254000"/>
+            <a:off x="4445000" y="1168400"/>
+            <a:ext cx="4445000" cy="304800"/>
           </a:xfrm>
           <a:prstGeom prst="rect">
             <a:avLst/>
@@ -11800,8 +11800,8 @@
         </p:nvSpPr>
         <p:spPr>
           <a:xfrm>
-            <a:off x="3048000" y="1270000"/>
-            <a:ext cx="1651000" cy="254000"/>
+            <a:off x="2984500" y="1473200"/>
+            <a:ext cx="1460500" cy="304800"/>
           </a:xfrm>
           <a:prstGeom prst="rect">
             <a:avLst/>
@@ -11837,8 +11837,8 @@
         </p:nvSpPr>
         <p:spPr>
           <a:xfrm>
-            <a:off x="4699000" y="1270000"/>
-            <a:ext cx="4445000" cy="254000"/>
+            <a:off x="4445000" y="1473200"/>
+            <a:ext cx="4445000" cy="304800"/>
           </a:xfrm>
           <a:prstGeom prst="rect">
             <a:avLst/>
@@ -11874,8 +11874,8 @@
         </p:nvSpPr>
         <p:spPr>
           <a:xfrm>
-            <a:off x="3048000" y="1524000"/>
-            <a:ext cx="1651000" cy="254000"/>
+            <a:off x="2984500" y="1778000"/>
+            <a:ext cx="1460500" cy="304800"/>
           </a:xfrm>
           <a:prstGeom prst="rect">
             <a:avLst/>
@@ -11911,8 +11911,8 @@
         </p:nvSpPr>
         <p:spPr>
           <a:xfrm>
-            <a:off x="4699000" y="1524000"/>
-            <a:ext cx="4445000" cy="254000"/>
+            <a:off x="4445000" y="1778000"/>
+            <a:ext cx="4445000" cy="304800"/>
           </a:xfrm>
           <a:prstGeom prst="rect">
             <a:avLst/>
@@ -11948,8 +11948,8 @@
         </p:nvSpPr>
         <p:spPr>
           <a:xfrm>
-            <a:off x="3048000" y="1778000"/>
-            <a:ext cx="1651000" cy="254000"/>
+            <a:off x="2984500" y="2082800"/>
+            <a:ext cx="1460500" cy="304800"/>
           </a:xfrm>
           <a:prstGeom prst="rect">
             <a:avLst/>
@@ -11985,8 +11985,8 @@
         </p:nvSpPr>
         <p:spPr>
           <a:xfrm>
-            <a:off x="4699000" y="1778000"/>
-            <a:ext cx="4445000" cy="254000"/>
+            <a:off x="4445000" y="2082800"/>
+            <a:ext cx="4445000" cy="304800"/>
           </a:xfrm>
           <a:prstGeom prst="rect">
             <a:avLst/>
@@ -12022,8 +12022,8 @@
         </p:nvSpPr>
         <p:spPr>
           <a:xfrm>
-            <a:off x="3048000" y="2032000"/>
-            <a:ext cx="1651000" cy="254000"/>
+            <a:off x="2984500" y="2387600"/>
+            <a:ext cx="1460500" cy="304800"/>
           </a:xfrm>
           <a:prstGeom prst="rect">
             <a:avLst/>
@@ -12059,8 +12059,8 @@
         </p:nvSpPr>
         <p:spPr>
           <a:xfrm>
-            <a:off x="4699000" y="2032000"/>
-            <a:ext cx="4445000" cy="254000"/>
+            <a:off x="4445000" y="2387600"/>
+            <a:ext cx="4445000" cy="304800"/>
           </a:xfrm>
           <a:prstGeom prst="rect">
             <a:avLst/>
@@ -12096,8 +12096,8 @@
         </p:nvSpPr>
         <p:spPr>
           <a:xfrm>
-            <a:off x="3048000" y="2286000"/>
-            <a:ext cx="1651000" cy="254000"/>
+            <a:off x="2984500" y="2692400"/>
+            <a:ext cx="1460500" cy="304800"/>
           </a:xfrm>
           <a:prstGeom prst="rect">
             <a:avLst/>
@@ -12133,8 +12133,8 @@
         </p:nvSpPr>
         <p:spPr>
           <a:xfrm>
-            <a:off x="4699000" y="2286000"/>
-            <a:ext cx="4445000" cy="254000"/>
+            <a:off x="4445000" y="2692400"/>
+            <a:ext cx="4445000" cy="304800"/>
           </a:xfrm>
           <a:prstGeom prst="rect">
             <a:avLst/>
@@ -12195,8 +12195,8 @@
         </p:nvSpPr>
         <p:spPr>
           <a:xfrm>
-            <a:off x="3048000" y="254000"/>
-            <a:ext cx="1651000" cy="254000"/>
+            <a:off x="2984500" y="254000"/>
+            <a:ext cx="1460500" cy="304800"/>
           </a:xfrm>
           <a:prstGeom prst="rect">
             <a:avLst/>
@@ -12232,8 +12232,8 @@
         </p:nvSpPr>
         <p:spPr>
           <a:xfrm>
-            <a:off x="4699000" y="254000"/>
-            <a:ext cx="4445000" cy="254000"/>
+            <a:off x="4445000" y="254000"/>
+            <a:ext cx="4445000" cy="304800"/>
           </a:xfrm>
           <a:prstGeom prst="rect">
             <a:avLst/>
@@ -12270,8 +12270,8 @@
         </p:nvSpPr>
         <p:spPr>
           <a:xfrm>
-            <a:off x="3048000" y="508000"/>
-            <a:ext cx="1651000" cy="254000"/>
+            <a:off x="2984500" y="558800"/>
+            <a:ext cx="1460500" cy="304800"/>
           </a:xfrm>
           <a:prstGeom prst="rect">
             <a:avLst/>
@@ -12307,8 +12307,8 @@
         </p:nvSpPr>
         <p:spPr>
           <a:xfrm>
-            <a:off x="4699000" y="508000"/>
-            <a:ext cx="4445000" cy="254000"/>
+            <a:off x="4445000" y="558800"/>
+            <a:ext cx="4445000" cy="304800"/>
           </a:xfrm>
           <a:prstGeom prst="rect">
             <a:avLst/>
@@ -12344,8 +12344,8 @@
         </p:nvSpPr>
         <p:spPr>
           <a:xfrm>
-            <a:off x="3048000" y="762000"/>
-            <a:ext cx="1651000" cy="254000"/>
+            <a:off x="2984500" y="863600"/>
+            <a:ext cx="1460500" cy="304800"/>
           </a:xfrm>
           <a:prstGeom prst="rect">
             <a:avLst/>
@@ -12381,8 +12381,8 @@
         </p:nvSpPr>
         <p:spPr>
           <a:xfrm>
-            <a:off x="4699000" y="762000"/>
-            <a:ext cx="4445000" cy="254000"/>
+            <a:off x="4445000" y="863600"/>
+            <a:ext cx="4445000" cy="304800"/>
           </a:xfrm>
           <a:prstGeom prst="rect">
             <a:avLst/>
@@ -12418,8 +12418,8 @@
         </p:nvSpPr>
         <p:spPr>
           <a:xfrm>
-            <a:off x="3048000" y="1016000"/>
-            <a:ext cx="1651000" cy="254000"/>
+            <a:off x="2984500" y="1168400"/>
+            <a:ext cx="1460500" cy="304800"/>
           </a:xfrm>
           <a:prstGeom prst="rect">
             <a:avLst/>
@@ -12455,8 +12455,8 @@
         </p:nvSpPr>
         <p:spPr>
           <a:xfrm>
-            <a:off x="4699000" y="1016000"/>
-            <a:ext cx="4445000" cy="254000"/>
+            <a:off x="4445000" y="1168400"/>
+            <a:ext cx="4445000" cy="304800"/>
           </a:xfrm>
           <a:prstGeom prst="rect">
             <a:avLst/>
@@ -12492,8 +12492,8 @@
         </p:nvSpPr>
         <p:spPr>
           <a:xfrm>
-            <a:off x="3048000" y="1270000"/>
-            <a:ext cx="1651000" cy="254000"/>
+            <a:off x="2984500" y="1473200"/>
+            <a:ext cx="1460500" cy="304800"/>
           </a:xfrm>
           <a:prstGeom prst="rect">
             <a:avLst/>
@@ -12529,8 +12529,8 @@
         </p:nvSpPr>
         <p:spPr>
           <a:xfrm>
-            <a:off x="4699000" y="1270000"/>
-            <a:ext cx="4445000" cy="254000"/>
+            <a:off x="4445000" y="1473200"/>
+            <a:ext cx="4445000" cy="304800"/>
           </a:xfrm>
           <a:prstGeom prst="rect">
             <a:avLst/>
@@ -12566,8 +12566,8 @@
         </p:nvSpPr>
         <p:spPr>
           <a:xfrm>
-            <a:off x="3048000" y="1524000"/>
-            <a:ext cx="1651000" cy="254000"/>
+            <a:off x="2984500" y="1778000"/>
+            <a:ext cx="1460500" cy="304800"/>
           </a:xfrm>
           <a:prstGeom prst="rect">
             <a:avLst/>
@@ -12603,8 +12603,8 @@
         </p:nvSpPr>
         <p:spPr>
           <a:xfrm>
-            <a:off x="4699000" y="1524000"/>
-            <a:ext cx="4445000" cy="254000"/>
+            <a:off x="4445000" y="1778000"/>
+            <a:ext cx="4445000" cy="304800"/>
           </a:xfrm>
           <a:prstGeom prst="rect">
             <a:avLst/>
@@ -12640,8 +12640,8 @@
         </p:nvSpPr>
         <p:spPr>
           <a:xfrm>
-            <a:off x="3048000" y="1778000"/>
-            <a:ext cx="1651000" cy="254000"/>
+            <a:off x="2984500" y="2082800"/>
+            <a:ext cx="1460500" cy="304800"/>
           </a:xfrm>
           <a:prstGeom prst="rect">
             <a:avLst/>
@@ -12677,8 +12677,8 @@
         </p:nvSpPr>
         <p:spPr>
           <a:xfrm>
-            <a:off x="4699000" y="1778000"/>
-            <a:ext cx="4445000" cy="254000"/>
+            <a:off x="4445000" y="2082800"/>
+            <a:ext cx="4445000" cy="304800"/>
           </a:xfrm>
           <a:prstGeom prst="rect">
             <a:avLst/>
@@ -12714,8 +12714,8 @@
         </p:nvSpPr>
         <p:spPr>
           <a:xfrm>
-            <a:off x="3048000" y="2032000"/>
-            <a:ext cx="1651000" cy="254000"/>
+            <a:off x="2984500" y="2387600"/>
+            <a:ext cx="1460500" cy="304800"/>
           </a:xfrm>
           <a:prstGeom prst="rect">
             <a:avLst/>
@@ -12751,8 +12751,8 @@
         </p:nvSpPr>
         <p:spPr>
           <a:xfrm>
-            <a:off x="4699000" y="2032000"/>
-            <a:ext cx="4445000" cy="254000"/>
+            <a:off x="4445000" y="2387600"/>
+            <a:ext cx="4445000" cy="304800"/>
           </a:xfrm>
           <a:prstGeom prst="rect">
             <a:avLst/>
@@ -12788,8 +12788,8 @@
         </p:nvSpPr>
         <p:spPr>
           <a:xfrm>
-            <a:off x="3048000" y="2286000"/>
-            <a:ext cx="1651000" cy="254000"/>
+            <a:off x="2984500" y="2692400"/>
+            <a:ext cx="1460500" cy="304800"/>
           </a:xfrm>
           <a:prstGeom prst="rect">
             <a:avLst/>
@@ -12825,8 +12825,8 @@
         </p:nvSpPr>
         <p:spPr>
           <a:xfrm>
-            <a:off x="4699000" y="2286000"/>
-            <a:ext cx="4445000" cy="254000"/>
+            <a:off x="4445000" y="2692400"/>
+            <a:ext cx="4445000" cy="304800"/>
           </a:xfrm>
           <a:prstGeom prst="rect">
             <a:avLst/>
@@ -12887,8 +12887,8 @@
         </p:nvSpPr>
         <p:spPr>
           <a:xfrm>
-            <a:off x="3048000" y="254000"/>
-            <a:ext cx="1651000" cy="254000"/>
+            <a:off x="2984500" y="254000"/>
+            <a:ext cx="1460500" cy="304800"/>
           </a:xfrm>
           <a:prstGeom prst="rect">
             <a:avLst/>
@@ -12924,8 +12924,8 @@
         </p:nvSpPr>
         <p:spPr>
           <a:xfrm>
-            <a:off x="4699000" y="254000"/>
-            <a:ext cx="4445000" cy="254000"/>
+            <a:off x="4445000" y="254000"/>
+            <a:ext cx="4445000" cy="304800"/>
           </a:xfrm>
           <a:prstGeom prst="rect">
             <a:avLst/>
@@ -12962,8 +12962,8 @@
         </p:nvSpPr>
         <p:spPr>
           <a:xfrm>
-            <a:off x="3048000" y="508000"/>
-            <a:ext cx="1651000" cy="254000"/>
+            <a:off x="2984500" y="558800"/>
+            <a:ext cx="1460500" cy="304800"/>
           </a:xfrm>
           <a:prstGeom prst="rect">
             <a:avLst/>
@@ -12999,8 +12999,8 @@
         </p:nvSpPr>
         <p:spPr>
           <a:xfrm>
-            <a:off x="4699000" y="508000"/>
-            <a:ext cx="4445000" cy="254000"/>
+            <a:off x="4445000" y="558800"/>
+            <a:ext cx="4445000" cy="304800"/>
           </a:xfrm>
           <a:prstGeom prst="rect">
             <a:avLst/>
@@ -13036,8 +13036,8 @@
         </p:nvSpPr>
         <p:spPr>
           <a:xfrm>
-            <a:off x="3048000" y="762000"/>
-            <a:ext cx="1651000" cy="254000"/>
+            <a:off x="2984500" y="863600"/>
+            <a:ext cx="1460500" cy="304800"/>
           </a:xfrm>
           <a:prstGeom prst="rect">
             <a:avLst/>
@@ -13073,8 +13073,8 @@
         </p:nvSpPr>
         <p:spPr>
           <a:xfrm>
-            <a:off x="4699000" y="762000"/>
-            <a:ext cx="4445000" cy="254000"/>
+            <a:off x="4445000" y="863600"/>
+            <a:ext cx="4445000" cy="304800"/>
           </a:xfrm>
           <a:prstGeom prst="rect">
             <a:avLst/>
@@ -13110,8 +13110,8 @@
         </p:nvSpPr>
         <p:spPr>
           <a:xfrm>
-            <a:off x="3048000" y="1016000"/>
-            <a:ext cx="1651000" cy="254000"/>
+            <a:off x="2984500" y="1168400"/>
+            <a:ext cx="1460500" cy="304800"/>
           </a:xfrm>
           <a:prstGeom prst="rect">
             <a:avLst/>
@@ -13147,8 +13147,8 @@
         </p:nvSpPr>
         <p:spPr>
           <a:xfrm>
-            <a:off x="4699000" y="1016000"/>
-            <a:ext cx="4445000" cy="254000"/>
+            <a:off x="4445000" y="1168400"/>
+            <a:ext cx="4445000" cy="304800"/>
           </a:xfrm>
           <a:prstGeom prst="rect">
             <a:avLst/>
@@ -13184,8 +13184,8 @@
         </p:nvSpPr>
         <p:spPr>
           <a:xfrm>
-            <a:off x="3048000" y="1270000"/>
-            <a:ext cx="1651000" cy="254000"/>
+            <a:off x="2984500" y="1473200"/>
+            <a:ext cx="1460500" cy="304800"/>
           </a:xfrm>
           <a:prstGeom prst="rect">
             <a:avLst/>
@@ -13221,8 +13221,8 @@
         </p:nvSpPr>
         <p:spPr>
           <a:xfrm>
-            <a:off x="4699000" y="1270000"/>
-            <a:ext cx="4445000" cy="254000"/>
+            <a:off x="4445000" y="1473200"/>
+            <a:ext cx="4445000" cy="304800"/>
           </a:xfrm>
           <a:prstGeom prst="rect">
             <a:avLst/>
@@ -13258,8 +13258,8 @@
         </p:nvSpPr>
         <p:spPr>
           <a:xfrm>
-            <a:off x="3048000" y="1524000"/>
-            <a:ext cx="1651000" cy="254000"/>
+            <a:off x="2984500" y="1778000"/>
+            <a:ext cx="1460500" cy="304800"/>
           </a:xfrm>
           <a:prstGeom prst="rect">
             <a:avLst/>
@@ -13295,8 +13295,8 @@
         </p:nvSpPr>
         <p:spPr>
           <a:xfrm>
-            <a:off x="4699000" y="1524000"/>
-            <a:ext cx="4445000" cy="254000"/>
+            <a:off x="4445000" y="1778000"/>
+            <a:ext cx="4445000" cy="304800"/>
           </a:xfrm>
           <a:prstGeom prst="rect">
             <a:avLst/>
@@ -13332,8 +13332,8 @@
         </p:nvSpPr>
         <p:spPr>
           <a:xfrm>
-            <a:off x="3048000" y="1778000"/>
-            <a:ext cx="1651000" cy="254000"/>
+            <a:off x="2984500" y="2082800"/>
+            <a:ext cx="1460500" cy="304800"/>
           </a:xfrm>
           <a:prstGeom prst="rect">
             <a:avLst/>
@@ -13369,8 +13369,8 @@
         </p:nvSpPr>
         <p:spPr>
           <a:xfrm>
-            <a:off x="4699000" y="1778000"/>
-            <a:ext cx="4445000" cy="254000"/>
+            <a:off x="4445000" y="2082800"/>
+            <a:ext cx="4445000" cy="304800"/>
           </a:xfrm>
           <a:prstGeom prst="rect">
             <a:avLst/>
@@ -13406,8 +13406,8 @@
         </p:nvSpPr>
         <p:spPr>
           <a:xfrm>
-            <a:off x="3048000" y="2032000"/>
-            <a:ext cx="1651000" cy="254000"/>
+            <a:off x="2984500" y="2387600"/>
+            <a:ext cx="1460500" cy="304800"/>
           </a:xfrm>
           <a:prstGeom prst="rect">
             <a:avLst/>
@@ -13443,8 +13443,8 @@
         </p:nvSpPr>
         <p:spPr>
           <a:xfrm>
-            <a:off x="4699000" y="2032000"/>
-            <a:ext cx="4445000" cy="254000"/>
+            <a:off x="4445000" y="2387600"/>
+            <a:ext cx="4445000" cy="304800"/>
           </a:xfrm>
           <a:prstGeom prst="rect">
             <a:avLst/>
@@ -13480,8 +13480,8 @@
         </p:nvSpPr>
         <p:spPr>
           <a:xfrm>
-            <a:off x="3048000" y="2286000"/>
-            <a:ext cx="1651000" cy="254000"/>
+            <a:off x="2984500" y="2692400"/>
+            <a:ext cx="1460500" cy="304800"/>
           </a:xfrm>
           <a:prstGeom prst="rect">
             <a:avLst/>
@@ -13517,8 +13517,8 @@
         </p:nvSpPr>
         <p:spPr>
           <a:xfrm>
-            <a:off x="4699000" y="2286000"/>
-            <a:ext cx="4445000" cy="254000"/>
+            <a:off x="4445000" y="2692400"/>
+            <a:ext cx="4445000" cy="304800"/>
           </a:xfrm>
           <a:prstGeom prst="rect">
             <a:avLst/>

</xml_diff>